<commit_message>
Further fix Softmax + CE
</commit_message>
<xml_diff>
--- a/5_nn/images/figures.pptx
+++ b/5_nn/images/figures.pptx
@@ -2992,7 +2992,7 @@
         <p:spPr>
           <a:xfrm>
             <a:off x="6804025" y="3244850"/>
-            <a:ext cx="3691255" cy="368300"/>
+            <a:ext cx="2802255" cy="368300"/>
           </a:xfrm>
           <a:prstGeom prst="rect">
             <a:avLst/>
@@ -3023,7 +3023,7 @@
                 <a:latin typeface="Times New Roman" panose="02020603050405020304" charset="0"/>
                 <a:cs typeface="Times New Roman" panose="02020603050405020304" charset="0"/>
               </a:rPr>
-              <a:t>= sigmoid(w</a:t>
+              <a:t>= w</a:t>
             </a:r>
             <a:r>
               <a:rPr lang="en-US" i="1" baseline="-25000">
@@ -3115,13 +3115,6 @@
                 <a:cs typeface="Times New Roman" panose="02020603050405020304" charset="0"/>
               </a:rPr>
               <a:t>b</a:t>
-            </a:r>
-            <a:r>
-              <a:rPr lang="en-US" i="1">
-                <a:latin typeface="Times New Roman" panose="02020603050405020304" charset="0"/>
-                <a:cs typeface="Times New Roman" panose="02020603050405020304" charset="0"/>
-              </a:rPr>
-              <a:t>)</a:t>
             </a:r>
             <a:endParaRPr lang="en-US" i="1">
               <a:latin typeface="Times New Roman" panose="02020603050405020304" charset="0"/>

</xml_diff>